<commit_message>
aktualny stav k 20170927
</commit_message>
<xml_diff>
--- a/Prezentacie/prezentacia.pptx
+++ b/Prezentacie/prezentacia.pptx
@@ -19,8 +19,8 @@
     <p:sldId id="265" r:id="rId10"/>
     <p:sldId id="268" r:id="rId11"/>
     <p:sldId id="261" r:id="rId12"/>
-    <p:sldId id="273" r:id="rId13"/>
-    <p:sldId id="272" r:id="rId14"/>
+    <p:sldId id="276" r:id="rId13"/>
+    <p:sldId id="273" r:id="rId14"/>
     <p:sldId id="257" r:id="rId15"/>
     <p:sldId id="270" r:id="rId16"/>
     <p:sldId id="262" r:id="rId17"/>
@@ -232,7 +232,7 @@
           <a:p>
             <a:fld id="{727BC873-594E-428D-B555-A2FF5C533890}" type="datetimeFigureOut">
               <a:rPr lang="sk-SK" smtClean="0"/>
-              <a:t>10.5.2017</a:t>
+              <a:t>27. 09. 2017</a:t>
             </a:fld>
             <a:endParaRPr lang="sk-SK"/>
           </a:p>
@@ -978,7 +978,7 @@
           <a:p>
             <a:fld id="{770B05AF-427F-4A9B-9C35-E082EAC8C421}" type="datetimeFigureOut">
               <a:rPr lang="sk-SK" smtClean="0"/>
-              <a:t>10.5.2017</a:t>
+              <a:t>27. 09. 2017</a:t>
             </a:fld>
             <a:endParaRPr lang="sk-SK"/>
           </a:p>
@@ -1186,7 +1186,7 @@
           <a:p>
             <a:fld id="{770B05AF-427F-4A9B-9C35-E082EAC8C421}" type="datetimeFigureOut">
               <a:rPr lang="sk-SK" smtClean="0"/>
-              <a:t>10.5.2017</a:t>
+              <a:t>27. 09. 2017</a:t>
             </a:fld>
             <a:endParaRPr lang="sk-SK"/>
           </a:p>
@@ -1442,7 +1442,7 @@
           <a:p>
             <a:fld id="{770B05AF-427F-4A9B-9C35-E082EAC8C421}" type="datetimeFigureOut">
               <a:rPr lang="sk-SK" smtClean="0"/>
-              <a:t>10.5.2017</a:t>
+              <a:t>27. 09. 2017</a:t>
             </a:fld>
             <a:endParaRPr lang="sk-SK"/>
           </a:p>
@@ -1612,7 +1612,7 @@
           <a:p>
             <a:fld id="{770B05AF-427F-4A9B-9C35-E082EAC8C421}" type="datetimeFigureOut">
               <a:rPr lang="sk-SK" smtClean="0"/>
-              <a:t>10.5.2017</a:t>
+              <a:t>27. 09. 2017</a:t>
             </a:fld>
             <a:endParaRPr lang="sk-SK"/>
           </a:p>
@@ -1955,7 +1955,7 @@
           <a:p>
             <a:fld id="{770B05AF-427F-4A9B-9C35-E082EAC8C421}" type="datetimeFigureOut">
               <a:rPr lang="sk-SK" smtClean="0"/>
-              <a:t>10.5.2017</a:t>
+              <a:t>27. 09. 2017</a:t>
             </a:fld>
             <a:endParaRPr lang="sk-SK"/>
           </a:p>
@@ -2230,7 +2230,7 @@
           <a:p>
             <a:fld id="{770B05AF-427F-4A9B-9C35-E082EAC8C421}" type="datetimeFigureOut">
               <a:rPr lang="sk-SK" smtClean="0"/>
-              <a:t>10.5.2017</a:t>
+              <a:t>27. 09. 2017</a:t>
             </a:fld>
             <a:endParaRPr lang="sk-SK"/>
           </a:p>
@@ -2609,7 +2609,7 @@
           <a:p>
             <a:fld id="{770B05AF-427F-4A9B-9C35-E082EAC8C421}" type="datetimeFigureOut">
               <a:rPr lang="sk-SK" smtClean="0"/>
-              <a:t>10.5.2017</a:t>
+              <a:t>27. 09. 2017</a:t>
             </a:fld>
             <a:endParaRPr lang="sk-SK"/>
           </a:p>
@@ -2727,7 +2727,7 @@
           <a:p>
             <a:fld id="{770B05AF-427F-4A9B-9C35-E082EAC8C421}" type="datetimeFigureOut">
               <a:rPr lang="sk-SK" smtClean="0"/>
-              <a:t>10.5.2017</a:t>
+              <a:t>27. 09. 2017</a:t>
             </a:fld>
             <a:endParaRPr lang="sk-SK"/>
           </a:p>
@@ -2898,7 +2898,7 @@
           <a:p>
             <a:fld id="{770B05AF-427F-4A9B-9C35-E082EAC8C421}" type="datetimeFigureOut">
               <a:rPr lang="sk-SK" smtClean="0"/>
-              <a:t>10.5.2017</a:t>
+              <a:t>27. 09. 2017</a:t>
             </a:fld>
             <a:endParaRPr lang="sk-SK"/>
           </a:p>
@@ -3252,7 +3252,7 @@
           <a:p>
             <a:fld id="{770B05AF-427F-4A9B-9C35-E082EAC8C421}" type="datetimeFigureOut">
               <a:rPr lang="sk-SK" smtClean="0"/>
-              <a:t>10.5.2017</a:t>
+              <a:t>27. 09. 2017</a:t>
             </a:fld>
             <a:endParaRPr lang="sk-SK"/>
           </a:p>
@@ -3629,7 +3629,7 @@
           <a:p>
             <a:fld id="{770B05AF-427F-4A9B-9C35-E082EAC8C421}" type="datetimeFigureOut">
               <a:rPr lang="sk-SK" smtClean="0"/>
-              <a:t>10.5.2017</a:t>
+              <a:t>27. 09. 2017</a:t>
             </a:fld>
             <a:endParaRPr lang="sk-SK"/>
           </a:p>
@@ -3916,7 +3916,7 @@
           <a:p>
             <a:fld id="{770B05AF-427F-4A9B-9C35-E082EAC8C421}" type="datetimeFigureOut">
               <a:rPr lang="sk-SK" smtClean="0"/>
-              <a:t>10.5.2017</a:t>
+              <a:t>27. 09. 2017</a:t>
             </a:fld>
             <a:endParaRPr lang="sk-SK"/>
           </a:p>
@@ -7316,13 +7316,9 @@
           <a:p>
             <a:r>
               <a:rPr lang="sk-SK" dirty="0" smtClean="0"/>
-              <a:t>Analýza </a:t>
-            </a:r>
-            <a:r>
-              <a:rPr lang="sk-SK" sz="2400" dirty="0" smtClean="0"/>
-              <a:t>alebo čomu sa budeme venovať</a:t>
-            </a:r>
-            <a:endParaRPr lang="sk-SK" sz="2400" dirty="0"/>
+              <a:t>Čo už máme</a:t>
+            </a:r>
+            <a:endParaRPr lang="sk-SK" dirty="0"/>
           </a:p>
         </p:txBody>
       </p:sp>
@@ -7341,80 +7337,72 @@
           <a:bodyPr/>
           <a:lstStyle/>
           <a:p>
-            <a:pPr>
-              <a:buFont typeface="Arial" panose="020B0604020202020204" pitchFamily="34" charset="0"/>
-              <a:buChar char="•"/>
-            </a:pPr>
-            <a:r>
-              <a:rPr lang="sk-SK" sz="2400" dirty="0" smtClean="0"/>
-              <a:t> Plánovač úloh procesora</a:t>
-            </a:r>
-          </a:p>
-          <a:p>
-            <a:pPr>
-              <a:buFont typeface="Arial" panose="020B0604020202020204" pitchFamily="34" charset="0"/>
-              <a:buChar char="•"/>
-            </a:pPr>
-            <a:r>
-              <a:rPr lang="sk-SK" sz="2400" dirty="0"/>
-              <a:t> </a:t>
-            </a:r>
-            <a:r>
-              <a:rPr lang="sk-SK" sz="2400" dirty="0" smtClean="0"/>
-              <a:t>Kompilátor</a:t>
-            </a:r>
-          </a:p>
-          <a:p>
-            <a:pPr>
-              <a:buFont typeface="Arial" panose="020B0604020202020204" pitchFamily="34" charset="0"/>
-              <a:buChar char="•"/>
-            </a:pPr>
-            <a:r>
-              <a:rPr lang="sk-SK" sz="2400" dirty="0"/>
-              <a:t> </a:t>
-            </a:r>
-            <a:r>
-              <a:rPr lang="sk-SK" sz="2400" dirty="0" smtClean="0"/>
-              <a:t>Analyzátor logiky programu</a:t>
-            </a:r>
-          </a:p>
-          <a:p>
-            <a:pPr>
-              <a:buFont typeface="Arial" panose="020B0604020202020204" pitchFamily="34" charset="0"/>
-              <a:buChar char="•"/>
-            </a:pPr>
-            <a:r>
-              <a:rPr lang="sk-SK" sz="2400" dirty="0"/>
-              <a:t> </a:t>
-            </a:r>
-            <a:r>
-              <a:rPr lang="sk-SK" sz="2400" dirty="0" smtClean="0"/>
-              <a:t>Implementovať komponenty</a:t>
-            </a:r>
-          </a:p>
-          <a:p>
-            <a:pPr>
-              <a:buFont typeface="Arial" panose="020B0604020202020204" pitchFamily="34" charset="0"/>
-              <a:buChar char="•"/>
-            </a:pPr>
-            <a:r>
-              <a:rPr lang="sk-SK" sz="2400" dirty="0"/>
-              <a:t> </a:t>
-            </a:r>
-            <a:r>
-              <a:rPr lang="sk-SK" sz="2400" dirty="0" smtClean="0"/>
-              <a:t>GUI</a:t>
-            </a:r>
-          </a:p>
-          <a:p>
-            <a:endParaRPr lang="sk-SK" dirty="0" smtClean="0"/>
+            <a:endParaRPr lang="sk-SK"/>
           </a:p>
         </p:txBody>
       </p:sp>
+      <p:pic>
+        <p:nvPicPr>
+          <p:cNvPr id="6" name="Obrázok 5"/>
+          <p:cNvPicPr>
+            <a:picLocks noChangeAspect="1"/>
+          </p:cNvPicPr>
+          <p:nvPr/>
+        </p:nvPicPr>
+        <p:blipFill>
+          <a:blip r:embed="rId2"/>
+          <a:stretch>
+            <a:fillRect/>
+          </a:stretch>
+        </p:blipFill>
+        <p:spPr>
+          <a:xfrm>
+            <a:off x="691440" y="1810566"/>
+            <a:ext cx="7806837" cy="4432794"/>
+          </a:xfrm>
+          <a:prstGeom prst="rect">
+            <a:avLst/>
+          </a:prstGeom>
+        </p:spPr>
+      </p:pic>
+      <p:pic>
+        <p:nvPicPr>
+          <p:cNvPr id="7" name="Obrázok 6"/>
+          <p:cNvPicPr>
+            <a:picLocks noChangeAspect="1"/>
+          </p:cNvPicPr>
+          <p:nvPr/>
+        </p:nvPicPr>
+        <p:blipFill>
+          <a:blip r:embed="rId3"/>
+          <a:stretch>
+            <a:fillRect/>
+          </a:stretch>
+        </p:blipFill>
+        <p:spPr>
+          <a:xfrm>
+            <a:off x="5482371" y="4150309"/>
+            <a:ext cx="2158146" cy="2093051"/>
+          </a:xfrm>
+          <a:prstGeom prst="rect">
+            <a:avLst/>
+          </a:prstGeom>
+          <a:ln>
+            <a:noFill/>
+          </a:ln>
+          <a:effectLst>
+            <a:outerShdw blurRad="190500" algn="tl" rotWithShape="0">
+              <a:srgbClr val="000000">
+                <a:alpha val="70000"/>
+              </a:srgbClr>
+            </a:outerShdw>
+          </a:effectLst>
+        </p:spPr>
+      </p:pic>
     </p:spTree>
     <p:extLst>
       <p:ext uri="{BB962C8B-B14F-4D97-AF65-F5344CB8AC3E}">
-        <p14:creationId xmlns:p14="http://schemas.microsoft.com/office/powerpoint/2010/main" val="2344161649"/>
+        <p14:creationId xmlns:p14="http://schemas.microsoft.com/office/powerpoint/2010/main" val="957596871"/>
       </p:ext>
     </p:extLst>
   </p:cSld>
@@ -7451,54 +7439,136 @@
             <p:ph type="title"/>
           </p:nvPr>
         </p:nvSpPr>
-        <p:spPr>
-          <a:xfrm>
-            <a:off x="822324" y="286605"/>
-            <a:ext cx="7543800" cy="1450757"/>
-          </a:xfrm>
-        </p:spPr>
+        <p:spPr/>
         <p:txBody>
           <a:bodyPr/>
           <a:lstStyle/>
           <a:p>
             <a:r>
-              <a:rPr lang="sk-SK" dirty="0" err="1" smtClean="0"/>
-              <a:t>Mock-up</a:t>
-            </a:r>
-            <a:endParaRPr lang="sk-SK" dirty="0"/>
+              <a:rPr lang="sk-SK" dirty="0" smtClean="0"/>
+              <a:t>Analýza </a:t>
+            </a:r>
+            <a:r>
+              <a:rPr lang="sk-SK" sz="2400" dirty="0" smtClean="0"/>
+              <a:t>alebo čomu sa budeme venovať</a:t>
+            </a:r>
+            <a:endParaRPr lang="sk-SK" sz="2400" dirty="0"/>
           </a:p>
         </p:txBody>
       </p:sp>
-      <p:pic>
-        <p:nvPicPr>
-          <p:cNvPr id="5" name="Zástupný objekt pre obsah 4"/>
-          <p:cNvPicPr>
-            <a:picLocks noGrp="1" noChangeAspect="1"/>
-          </p:cNvPicPr>
+      <p:sp>
+        <p:nvSpPr>
+          <p:cNvPr id="3" name="Zástupný objekt pre obsah 2"/>
+          <p:cNvSpPr>
+            <a:spLocks noGrp="1"/>
+          </p:cNvSpPr>
           <p:nvPr>
             <p:ph idx="1"/>
           </p:nvPr>
-        </p:nvPicPr>
-        <p:blipFill>
-          <a:blip r:embed="rId2"/>
-          <a:stretch>
-            <a:fillRect/>
-          </a:stretch>
-        </p:blipFill>
-        <p:spPr>
-          <a:xfrm>
-            <a:off x="1343485" y="1846263"/>
-            <a:ext cx="6501479" cy="4022725"/>
-          </a:xfrm>
-          <a:prstGeom prst="rect">
-            <a:avLst/>
-          </a:prstGeom>
-        </p:spPr>
-      </p:pic>
+        </p:nvSpPr>
+        <p:spPr/>
+        <p:txBody>
+          <a:bodyPr/>
+          <a:lstStyle/>
+          <a:p>
+            <a:pPr>
+              <a:buFont typeface="Arial" panose="020B0604020202020204" pitchFamily="34" charset="0"/>
+              <a:buChar char="•"/>
+            </a:pPr>
+            <a:r>
+              <a:rPr lang="sk-SK" sz="2400" dirty="0" smtClean="0"/>
+              <a:t> Plánovač úloh procesora</a:t>
+            </a:r>
+          </a:p>
+          <a:p>
+            <a:pPr>
+              <a:buFont typeface="Arial" panose="020B0604020202020204" pitchFamily="34" charset="0"/>
+              <a:buChar char="•"/>
+            </a:pPr>
+            <a:r>
+              <a:rPr lang="sk-SK" sz="2400" dirty="0"/>
+              <a:t> </a:t>
+            </a:r>
+            <a:r>
+              <a:rPr lang="sk-SK" sz="2400" strike="sngStrike" dirty="0" smtClean="0"/>
+              <a:t>Kompilátor</a:t>
+            </a:r>
+          </a:p>
+          <a:p>
+            <a:pPr>
+              <a:buFont typeface="Arial" panose="020B0604020202020204" pitchFamily="34" charset="0"/>
+              <a:buChar char="•"/>
+            </a:pPr>
+            <a:r>
+              <a:rPr lang="sk-SK" sz="2400" dirty="0"/>
+              <a:t> </a:t>
+            </a:r>
+            <a:r>
+              <a:rPr lang="sk-SK" sz="2400" dirty="0" smtClean="0"/>
+              <a:t>Analyzátor logiky programu</a:t>
+            </a:r>
+          </a:p>
+          <a:p>
+            <a:pPr>
+              <a:buFont typeface="Arial" panose="020B0604020202020204" pitchFamily="34" charset="0"/>
+              <a:buChar char="•"/>
+            </a:pPr>
+            <a:r>
+              <a:rPr lang="sk-SK" sz="2400" dirty="0"/>
+              <a:t> </a:t>
+            </a:r>
+            <a:r>
+              <a:rPr lang="sk-SK" sz="2400" dirty="0" smtClean="0"/>
+              <a:t>Implementovať komponenty</a:t>
+            </a:r>
+          </a:p>
+          <a:p>
+            <a:pPr>
+              <a:buFont typeface="Arial" panose="020B0604020202020204" pitchFamily="34" charset="0"/>
+              <a:buChar char="•"/>
+            </a:pPr>
+            <a:r>
+              <a:rPr lang="sk-SK" sz="2400" dirty="0"/>
+              <a:t> </a:t>
+            </a:r>
+            <a:r>
+              <a:rPr lang="sk-SK" sz="2400" strike="sngStrike" dirty="0" smtClean="0"/>
+              <a:t>GUI</a:t>
+            </a:r>
+            <a:endParaRPr lang="sk-SK" sz="2400" dirty="0" smtClean="0"/>
+          </a:p>
+          <a:p>
+            <a:pPr>
+              <a:buFont typeface="Arial" panose="020B0604020202020204" pitchFamily="34" charset="0"/>
+              <a:buChar char="•"/>
+            </a:pPr>
+            <a:r>
+              <a:rPr lang="sk-SK" sz="2400" dirty="0" err="1" smtClean="0"/>
+              <a:t>Abstract</a:t>
+            </a:r>
+            <a:r>
+              <a:rPr lang="sk-SK" sz="2400" dirty="0" smtClean="0"/>
+              <a:t> syntax </a:t>
+            </a:r>
+            <a:r>
+              <a:rPr lang="sk-SK" sz="2400" dirty="0" err="1" smtClean="0"/>
+              <a:t>tree</a:t>
+            </a:r>
+            <a:r>
+              <a:rPr lang="sk-SK" sz="2400" dirty="0" smtClean="0"/>
+              <a:t> pre editor</a:t>
+            </a:r>
+            <a:endParaRPr lang="sk-SK" sz="2400" dirty="0" smtClean="0"/>
+          </a:p>
+          <a:p>
+            <a:endParaRPr lang="sk-SK" dirty="0" smtClean="0"/>
+          </a:p>
+        </p:txBody>
+      </p:sp>
     </p:spTree>
     <p:extLst>
       <p:ext uri="{BB962C8B-B14F-4D97-AF65-F5344CB8AC3E}">
-        <p14:creationId xmlns:p14="http://schemas.microsoft.com/office/powerpoint/2010/main" val="3870488756"/>
+        <p14:creationId xmlns:p14="http://schemas.microsoft.com/office/powerpoint/2010/main" val="2344161649"/>
       </p:ext>
     </p:extLst>
   </p:cSld>

</xml_diff>